<commit_message>
Adjusted versions Text correction in the landscape picture (wrongly placed brackets)
</commit_message>
<xml_diff>
--- a/OSP software landscape.pptx
+++ b/OSP software landscape.pptx
@@ -246,7 +246,7 @@
           <a:p>
             <a:fld id="{F32EF3B0-CF6E-47C7-B2C1-1DA818778E1A}" type="datetimeFigureOut">
               <a:rPr lang="en-US" smtClean="0"/>
-              <a:t>4/26/2021</a:t>
+              <a:t>4/14/2023</a:t>
             </a:fld>
             <a:endParaRPr lang="en-US"/>
           </a:p>
@@ -416,7 +416,7 @@
           <a:p>
             <a:fld id="{F32EF3B0-CF6E-47C7-B2C1-1DA818778E1A}" type="datetimeFigureOut">
               <a:rPr lang="en-US" smtClean="0"/>
-              <a:t>4/26/2021</a:t>
+              <a:t>4/14/2023</a:t>
             </a:fld>
             <a:endParaRPr lang="en-US"/>
           </a:p>
@@ -596,7 +596,7 @@
           <a:p>
             <a:fld id="{F32EF3B0-CF6E-47C7-B2C1-1DA818778E1A}" type="datetimeFigureOut">
               <a:rPr lang="en-US" smtClean="0"/>
-              <a:t>4/26/2021</a:t>
+              <a:t>4/14/2023</a:t>
             </a:fld>
             <a:endParaRPr lang="en-US"/>
           </a:p>
@@ -905,7 +905,7 @@
           <a:p>
             <a:fld id="{579268C1-3555-40F0-9F50-FDE1FC183A0D}" type="datetime1">
               <a:rPr lang="en-US" smtClean="0"/>
-              <a:t>4/26/2021</a:t>
+              <a:t>4/14/2023</a:t>
             </a:fld>
             <a:endParaRPr lang="en-US" dirty="0"/>
           </a:p>
@@ -1730,7 +1730,7 @@
           <a:p>
             <a:fld id="{9F33C267-8000-477D-991A-6C15839D7000}" type="datetime1">
               <a:rPr lang="en-US" smtClean="0"/>
-              <a:t>4/26/2021</a:t>
+              <a:t>4/14/2023</a:t>
             </a:fld>
             <a:endParaRPr lang="en-US" dirty="0"/>
           </a:p>
@@ -2765,7 +2765,7 @@
           <a:p>
             <a:fld id="{8CDB9F33-836B-4915-B13C-79B01E209756}" type="datetime1">
               <a:rPr lang="en-US" smtClean="0"/>
-              <a:t>4/26/2021</a:t>
+              <a:t>4/14/2023</a:t>
             </a:fld>
             <a:endParaRPr lang="en-US" dirty="0"/>
           </a:p>
@@ -3667,7 +3667,7 @@
           <a:p>
             <a:fld id="{48FAAE86-FF76-44CC-A668-018373AE554F}" type="datetime1">
               <a:rPr lang="en-US" smtClean="0"/>
-              <a:t>4/26/2021</a:t>
+              <a:t>4/14/2023</a:t>
             </a:fld>
             <a:endParaRPr lang="en-US" dirty="0"/>
           </a:p>
@@ -4192,7 +4192,7 @@
           <a:p>
             <a:fld id="{37D638D7-8796-4CCC-8CE6-AEAD9E04E798}" type="datetime1">
               <a:rPr lang="en-US" smtClean="0"/>
-              <a:t>4/26/2021</a:t>
+              <a:t>4/14/2023</a:t>
             </a:fld>
             <a:endParaRPr lang="en-US" dirty="0"/>
           </a:p>
@@ -5271,7 +5271,7 @@
           <a:p>
             <a:fld id="{DD080DD9-49B8-4603-936C-6A08F0541BA0}" type="datetime1">
               <a:rPr lang="en-US" smtClean="0"/>
-              <a:t>4/26/2021</a:t>
+              <a:t>4/14/2023</a:t>
             </a:fld>
             <a:endParaRPr lang="en-US" dirty="0"/>
           </a:p>
@@ -5914,7 +5914,7 @@
           <a:p>
             <a:fld id="{C67E0C7B-342B-4B60-BBFA-D89E1406DD42}" type="datetime1">
               <a:rPr lang="en-US" smtClean="0"/>
-              <a:t>4/26/2021</a:t>
+              <a:t>4/14/2023</a:t>
             </a:fld>
             <a:endParaRPr lang="en-US" dirty="0"/>
           </a:p>
@@ -6614,7 +6614,7 @@
           <a:p>
             <a:fld id="{1240F759-6C5A-4A96-885E-3AC3B4871ADC}" type="datetime1">
               <a:rPr lang="en-US" smtClean="0"/>
-              <a:t>4/26/2021</a:t>
+              <a:t>4/14/2023</a:t>
             </a:fld>
             <a:endParaRPr lang="en-US" dirty="0"/>
           </a:p>
@@ -6931,7 +6931,7 @@
           <a:p>
             <a:fld id="{F32EF3B0-CF6E-47C7-B2C1-1DA818778E1A}" type="datetimeFigureOut">
               <a:rPr lang="en-US" smtClean="0"/>
-              <a:t>4/26/2021</a:t>
+              <a:t>4/14/2023</a:t>
             </a:fld>
             <a:endParaRPr lang="en-US"/>
           </a:p>
@@ -7151,7 +7151,7 @@
           <a:p>
             <a:fld id="{5CC9A96C-B18F-4A61-9FE9-4BC0ED17C09C}" type="datetime1">
               <a:rPr lang="en-US" smtClean="0"/>
-              <a:t>4/26/2021</a:t>
+              <a:t>4/14/2023</a:t>
             </a:fld>
             <a:endParaRPr lang="en-US" dirty="0"/>
           </a:p>
@@ -7654,7 +7654,7 @@
           <a:p>
             <a:fld id="{64ACC3FA-741F-4DD7-A29C-E85845E74CE5}" type="datetime1">
               <a:rPr lang="en-US" smtClean="0"/>
-              <a:t>4/26/2021</a:t>
+              <a:t>4/14/2023</a:t>
             </a:fld>
             <a:endParaRPr lang="en-US" dirty="0"/>
           </a:p>
@@ -8241,7 +8241,7 @@
           <a:p>
             <a:fld id="{F09B50E6-EFC3-4D55-B5FD-6C07B3F1809C}" type="datetime1">
               <a:rPr lang="en-US" smtClean="0"/>
-              <a:t>4/26/2021</a:t>
+              <a:t>4/14/2023</a:t>
             </a:fld>
             <a:endParaRPr lang="en-US" dirty="0"/>
           </a:p>
@@ -8648,7 +8648,7 @@
           <a:p>
             <a:fld id="{7CF3B6FA-5BE5-423F-AE86-D3FCA9B0BA1B}" type="datetime1">
               <a:rPr lang="en-US" smtClean="0"/>
-              <a:t>4/26/2021</a:t>
+              <a:t>4/14/2023</a:t>
             </a:fld>
             <a:endParaRPr lang="en-US" dirty="0"/>
           </a:p>
@@ -8927,7 +8927,7 @@
           <a:p>
             <a:fld id="{54D65EF7-0DB8-46AD-91BA-1361F976A2E5}" type="datetime1">
               <a:rPr lang="en-US" smtClean="0"/>
-              <a:t>4/26/2021</a:t>
+              <a:t>4/14/2023</a:t>
             </a:fld>
             <a:endParaRPr lang="en-US" dirty="0"/>
           </a:p>
@@ -9381,7 +9381,7 @@
           <a:p>
             <a:fld id="{91DAC8AC-69B9-434F-A771-029EB0ECF11E}" type="datetime1">
               <a:rPr lang="en-US" smtClean="0"/>
-              <a:t>4/26/2021</a:t>
+              <a:t>4/14/2023</a:t>
             </a:fld>
             <a:endParaRPr lang="en-US" dirty="0"/>
           </a:p>
@@ -10366,7 +10366,7 @@
           <a:p>
             <a:fld id="{5576CC04-5BC7-4D90-881D-F4830D1A1CA8}" type="datetime1">
               <a:rPr lang="en-US" smtClean="0"/>
-              <a:t>4/26/2021</a:t>
+              <a:t>4/14/2023</a:t>
             </a:fld>
             <a:endParaRPr lang="en-US" dirty="0"/>
           </a:p>
@@ -11351,7 +11351,7 @@
           <a:p>
             <a:fld id="{42804E57-7BF7-4369-9EB4-F1EAB6B023F9}" type="datetime1">
               <a:rPr lang="en-US" smtClean="0"/>
-              <a:t>4/26/2021</a:t>
+              <a:t>4/14/2023</a:t>
             </a:fld>
             <a:endParaRPr lang="en-US" dirty="0"/>
           </a:p>
@@ -12236,7 +12236,7 @@
           <a:p>
             <a:fld id="{7819D966-6B5C-4844-BFB2-43E4A3473364}" type="datetime1">
               <a:rPr lang="en-US" smtClean="0"/>
-              <a:t>4/26/2021</a:t>
+              <a:t>4/14/2023</a:t>
             </a:fld>
             <a:endParaRPr lang="en-US" dirty="0"/>
           </a:p>
@@ -12921,7 +12921,7 @@
           <a:p>
             <a:fld id="{F0858C22-807B-43F5-8A6E-8319E9F1466D}" type="datetime1">
               <a:rPr lang="en-US" smtClean="0"/>
-              <a:t>4/26/2021</a:t>
+              <a:t>4/14/2023</a:t>
             </a:fld>
             <a:endParaRPr lang="en-US" dirty="0"/>
           </a:p>
@@ -13646,7 +13646,7 @@
           <a:p>
             <a:fld id="{F32EF3B0-CF6E-47C7-B2C1-1DA818778E1A}" type="datetimeFigureOut">
               <a:rPr lang="en-US" smtClean="0"/>
-              <a:t>4/26/2021</a:t>
+              <a:t>4/14/2023</a:t>
             </a:fld>
             <a:endParaRPr lang="en-US"/>
           </a:p>
@@ -13850,7 +13850,7 @@
           <a:p>
             <a:fld id="{57F28C20-F3BB-45EA-B82D-5FFBE4E3F507}" type="datetime1">
               <a:rPr lang="en-US" smtClean="0"/>
-              <a:t>4/26/2021</a:t>
+              <a:t>4/14/2023</a:t>
             </a:fld>
             <a:endParaRPr lang="en-US" dirty="0"/>
           </a:p>
@@ -14640,7 +14640,7 @@
           <a:p>
             <a:fld id="{579268C1-3555-40F0-9F50-FDE1FC183A0D}" type="datetime1">
               <a:rPr lang="en-US" smtClean="0"/>
-              <a:t>4/26/2021</a:t>
+              <a:t>4/14/2023</a:t>
             </a:fld>
             <a:endParaRPr lang="en-US" dirty="0"/>
           </a:p>
@@ -15745,7 +15745,7 @@
           <a:p>
             <a:fld id="{F32EF3B0-CF6E-47C7-B2C1-1DA818778E1A}" type="datetimeFigureOut">
               <a:rPr lang="en-US" smtClean="0"/>
-              <a:t>4/26/2021</a:t>
+              <a:t>4/14/2023</a:t>
             </a:fld>
             <a:endParaRPr lang="en-US"/>
           </a:p>
@@ -16112,7 +16112,7 @@
           <a:p>
             <a:fld id="{F32EF3B0-CF6E-47C7-B2C1-1DA818778E1A}" type="datetimeFigureOut">
               <a:rPr lang="en-US" smtClean="0"/>
-              <a:t>4/26/2021</a:t>
+              <a:t>4/14/2023</a:t>
             </a:fld>
             <a:endParaRPr lang="en-US"/>
           </a:p>
@@ -16230,7 +16230,7 @@
           <a:p>
             <a:fld id="{F32EF3B0-CF6E-47C7-B2C1-1DA818778E1A}" type="datetimeFigureOut">
               <a:rPr lang="en-US" smtClean="0"/>
-              <a:t>4/26/2021</a:t>
+              <a:t>4/14/2023</a:t>
             </a:fld>
             <a:endParaRPr lang="en-US"/>
           </a:p>
@@ -16325,7 +16325,7 @@
           <a:p>
             <a:fld id="{F32EF3B0-CF6E-47C7-B2C1-1DA818778E1A}" type="datetimeFigureOut">
               <a:rPr lang="en-US" smtClean="0"/>
-              <a:t>4/26/2021</a:t>
+              <a:t>4/14/2023</a:t>
             </a:fld>
             <a:endParaRPr lang="en-US"/>
           </a:p>
@@ -16602,7 +16602,7 @@
           <a:p>
             <a:fld id="{F32EF3B0-CF6E-47C7-B2C1-1DA818778E1A}" type="datetimeFigureOut">
               <a:rPr lang="en-US" smtClean="0"/>
-              <a:t>4/26/2021</a:t>
+              <a:t>4/14/2023</a:t>
             </a:fld>
             <a:endParaRPr lang="en-US"/>
           </a:p>
@@ -16859,7 +16859,7 @@
           <a:p>
             <a:fld id="{F32EF3B0-CF6E-47C7-B2C1-1DA818778E1A}" type="datetimeFigureOut">
               <a:rPr lang="en-US" smtClean="0"/>
-              <a:t>4/26/2021</a:t>
+              <a:t>4/14/2023</a:t>
             </a:fld>
             <a:endParaRPr lang="en-US"/>
           </a:p>
@@ -17072,7 +17072,7 @@
           <a:p>
             <a:fld id="{F32EF3B0-CF6E-47C7-B2C1-1DA818778E1A}" type="datetimeFigureOut">
               <a:rPr lang="en-US" smtClean="0"/>
-              <a:t>4/26/2021</a:t>
+              <a:t>4/14/2023</a:t>
             </a:fld>
             <a:endParaRPr lang="en-US"/>
           </a:p>
@@ -17719,7 +17719,7 @@
           <a:p>
             <a:fld id="{8E91F6B7-D9DD-40B9-8E0F-7B4E75E5DBFB}" type="datetime1">
               <a:rPr lang="en-US" smtClean="0"/>
-              <a:t>4/26/2021</a:t>
+              <a:t>4/14/2023</a:t>
             </a:fld>
             <a:endParaRPr lang="en-US" dirty="0"/>
           </a:p>
@@ -20249,7 +20249,7 @@
                 </a:solidFill>
                 <a:latin typeface="Arial" panose="020B0604020202020204" pitchFamily="34" charset="0"/>
               </a:rPr>
-              <a:t>PB(QSP)</a:t>
+              <a:t>(PB)QSP</a:t>
             </a:r>
             <a:r>
               <a:rPr lang="en-US" sz="1400" b="0" i="0" u="none" baseline="0" dirty="0">

</xml_diff>